<commit_message>
Additional improvements/checking and synthesizing paragraph.
</commit_message>
<xml_diff>
--- a/Figures/AnInformativeEncodingofConstructorsTags.pptx
+++ b/Figures/AnInformativeEncodingofConstructorsTags.pptx
@@ -3154,6 +3154,155 @@
             <a:r>
               <a:rPr lang="en-GB" dirty="0" err="1">
                 <a:solidFill>
+                  <a:schemeClr val="accent2"/>
+                </a:solidFill>
+                <a:latin typeface="Lucida Console"/>
+                <a:cs typeface="Lucida Console"/>
+              </a:rPr>
+              <a:t>CLabel</a:t>
+            </a:r>
+            <a:r>
+              <a:rPr lang="en-GB" dirty="0">
+                <a:solidFill>
+                  <a:schemeClr val="accent2"/>
+                </a:solidFill>
+                <a:latin typeface="Lucida Console"/>
+                <a:cs typeface="Lucida Console"/>
+              </a:rPr>
+              <a:t> </a:t>
+            </a:r>
+            <a:r>
+              <a:rPr lang="en-GB" dirty="0">
+                <a:latin typeface="Lucida Console"/>
+                <a:cs typeface="Lucida Console"/>
+              </a:rPr>
+              <a:t>-&gt; </a:t>
+            </a:r>
+            <a:r>
+              <a:rPr lang="en-GB" dirty="0" err="1">
+                <a:solidFill>
+                  <a:srgbClr val="C0504D"/>
+                </a:solidFill>
+                <a:latin typeface="Lucida Console"/>
+                <a:cs typeface="Lucida Console"/>
+              </a:rPr>
+              <a:t>CEnum</a:t>
+            </a:r>
+            <a:r>
+              <a:rPr lang="en-GB" dirty="0">
+                <a:solidFill>
+                  <a:srgbClr val="C0504D"/>
+                </a:solidFill>
+                <a:latin typeface="Lucida Console"/>
+                <a:cs typeface="Lucida Console"/>
+              </a:rPr>
+              <a:t> </a:t>
+            </a:r>
+            <a:r>
+              <a:rPr lang="en-GB" dirty="0">
+                <a:latin typeface="Lucida Console"/>
+                <a:cs typeface="Lucida Console"/>
+              </a:rPr>
+              <a:t>-&gt; </a:t>
+            </a:r>
+            <a:r>
+              <a:rPr lang="en-GB" dirty="0">
+                <a:solidFill>
+                  <a:schemeClr val="tx2">
+                    <a:lumMod val="60000"/>
+                    <a:lumOff val="40000"/>
+                  </a:schemeClr>
+                </a:solidFill>
+                <a:latin typeface="Lucida Console"/>
+                <a:cs typeface="Lucida Console"/>
+              </a:rPr>
+              <a:t>Type</a:t>
+            </a:r>
+            <a:r>
+              <a:rPr lang="en-GB" dirty="0">
+                <a:latin typeface="Lucida Console"/>
+                <a:cs typeface="Lucida Console"/>
+              </a:rPr>
+              <a:t> </a:t>
+            </a:r>
+            <a:r>
+              <a:rPr lang="en-GB" b="1" dirty="0" smtClean="0">
+                <a:latin typeface="Lucida Console"/>
+                <a:cs typeface="Lucida Console"/>
+              </a:rPr>
+              <a:t>where</a:t>
+            </a:r>
+            <a:r>
+              <a:rPr lang="en-GB" dirty="0" smtClean="0">
+                <a:latin typeface="Lucida Console"/>
+                <a:cs typeface="Lucida Console"/>
+              </a:rPr>
+              <a:t>  	</a:t>
+            </a:r>
+            <a:r>
+              <a:rPr lang="en-GB" dirty="0" smtClean="0">
+                <a:solidFill>
+                  <a:schemeClr val="accent3"/>
+                </a:solidFill>
+                <a:latin typeface="Lucida Console"/>
+                <a:cs typeface="Lucida Console"/>
+              </a:rPr>
+              <a:t>TZ</a:t>
+            </a:r>
+            <a:r>
+              <a:rPr lang="en-GB" dirty="0" smtClean="0">
+                <a:latin typeface="Lucida Console"/>
+                <a:cs typeface="Lucida Console"/>
+              </a:rPr>
+              <a:t> </a:t>
+            </a:r>
+            <a:r>
+              <a:rPr lang="en-GB" dirty="0">
+                <a:latin typeface="Lucida Console"/>
+                <a:cs typeface="Lucida Console"/>
+              </a:rPr>
+              <a:t>: </a:t>
+            </a:r>
+            <a:r>
+              <a:rPr lang="en-GB" dirty="0">
+                <a:solidFill>
+                  <a:schemeClr val="tx2">
+                    <a:lumMod val="60000"/>
+                    <a:lumOff val="40000"/>
+                  </a:schemeClr>
+                </a:solidFill>
+                <a:latin typeface="Lucida Console"/>
+                <a:cs typeface="Lucida Console"/>
+              </a:rPr>
+              <a:t>Tag</a:t>
+            </a:r>
+            <a:r>
+              <a:rPr lang="en-GB" dirty="0">
+                <a:latin typeface="Lucida Console"/>
+                <a:cs typeface="Lucida Console"/>
+              </a:rPr>
+              <a:t> </a:t>
+            </a:r>
+            <a:r>
+              <a:rPr lang="en-GB" dirty="0">
+                <a:solidFill>
+                  <a:srgbClr val="D99694"/>
+                </a:solidFill>
+                <a:latin typeface="Lucida Console"/>
+                <a:cs typeface="Lucida Console"/>
+              </a:rPr>
+              <a:t>l</a:t>
+            </a:r>
+            <a:r>
+              <a:rPr lang="en-GB" dirty="0">
+                <a:latin typeface="Lucida Console"/>
+                <a:cs typeface="Lucida Console"/>
+              </a:rPr>
+              <a:t> (</a:t>
+            </a:r>
+            <a:r>
+              <a:rPr lang="en-GB" dirty="0">
+                <a:solidFill>
                   <a:schemeClr val="accent2">
                     <a:lumMod val="60000"/>
                     <a:lumOff val="40000"/>
@@ -3162,16 +3311,10 @@
                 <a:latin typeface="Lucida Console"/>
                 <a:cs typeface="Lucida Console"/>
               </a:rPr>
-              <a:t>CLabel</a:t>
+              <a:t>l</a:t>
             </a:r>
             <a:r>
               <a:rPr lang="en-GB" dirty="0">
-                <a:solidFill>
-                  <a:schemeClr val="accent2">
-                    <a:lumMod val="60000"/>
-                    <a:lumOff val="40000"/>
-                  </a:schemeClr>
-                </a:solidFill>
                 <a:latin typeface="Lucida Console"/>
                 <a:cs typeface="Lucida Console"/>
               </a:rPr>
@@ -3179,37 +3322,114 @@
             </a:r>
             <a:r>
               <a:rPr lang="en-GB" dirty="0">
-                <a:latin typeface="Lucida Console"/>
-                <a:cs typeface="Lucida Console"/>
-              </a:rPr>
-              <a:t>-&gt; </a:t>
-            </a:r>
-            <a:r>
-              <a:rPr lang="en-GB" dirty="0" err="1">
+                <a:solidFill>
+                  <a:schemeClr val="accent3"/>
+                </a:solidFill>
+                <a:latin typeface="Lucida Console"/>
+                <a:cs typeface="Lucida Console"/>
+              </a:rPr>
+              <a:t>:: </a:t>
+            </a:r>
+            <a:r>
+              <a:rPr lang="en-GB" dirty="0">
                 <a:solidFill>
                   <a:srgbClr val="D99694"/>
                 </a:solidFill>
                 <a:latin typeface="Lucida Console"/>
                 <a:cs typeface="Lucida Console"/>
               </a:rPr>
-              <a:t>CEnum</a:t>
+              <a:t>e</a:t>
             </a:r>
             <a:r>
               <a:rPr lang="en-GB" dirty="0">
+                <a:latin typeface="Lucida Console"/>
+                <a:cs typeface="Lucida Console"/>
+              </a:rPr>
+              <a:t>)</a:t>
+            </a:r>
+          </a:p>
+          <a:p>
+            <a:r>
+              <a:rPr lang="en-GB" dirty="0" smtClean="0">
+                <a:latin typeface="Lucida Console"/>
+                <a:cs typeface="Lucida Console"/>
+              </a:rPr>
+              <a:t>	</a:t>
+            </a:r>
+            <a:r>
+              <a:rPr lang="en-GB" dirty="0" smtClean="0">
+                <a:solidFill>
+                  <a:srgbClr val="9BBB59"/>
+                </a:solidFill>
+                <a:latin typeface="Lucida Console"/>
+                <a:cs typeface="Lucida Console"/>
+              </a:rPr>
+              <a:t>TS</a:t>
+            </a:r>
+            <a:r>
+              <a:rPr lang="en-GB" dirty="0" smtClean="0">
+                <a:latin typeface="Lucida Console"/>
+                <a:cs typeface="Lucida Console"/>
+              </a:rPr>
+              <a:t> </a:t>
+            </a:r>
+            <a:r>
+              <a:rPr lang="en-GB" dirty="0">
+                <a:latin typeface="Lucida Console"/>
+                <a:cs typeface="Lucida Console"/>
+              </a:rPr>
+              <a:t>: </a:t>
+            </a:r>
+            <a:r>
+              <a:rPr lang="en-GB" dirty="0">
+                <a:solidFill>
+                  <a:srgbClr val="558ED5"/>
+                </a:solidFill>
+                <a:latin typeface="Lucida Console"/>
+                <a:cs typeface="Lucida Console"/>
+              </a:rPr>
+              <a:t>Tag</a:t>
+            </a:r>
+            <a:r>
+              <a:rPr lang="en-GB" dirty="0">
+                <a:latin typeface="Lucida Console"/>
+                <a:cs typeface="Lucida Console"/>
+              </a:rPr>
+              <a:t> </a:t>
+            </a:r>
+            <a:r>
+              <a:rPr lang="en-GB" dirty="0">
                 <a:solidFill>
                   <a:srgbClr val="D99694"/>
                 </a:solidFill>
                 <a:latin typeface="Lucida Console"/>
                 <a:cs typeface="Lucida Console"/>
               </a:rPr>
+              <a:t>l</a:t>
+            </a:r>
+            <a:r>
+              <a:rPr lang="en-GB" dirty="0">
+                <a:latin typeface="Lucida Console"/>
+                <a:cs typeface="Lucida Console"/>
+              </a:rPr>
               <a:t> </a:t>
             </a:r>
             <a:r>
               <a:rPr lang="en-GB" dirty="0">
-                <a:latin typeface="Lucida Console"/>
-                <a:cs typeface="Lucida Console"/>
-              </a:rPr>
-              <a:t>-&gt; </a:t>
+                <a:solidFill>
+                  <a:srgbClr val="D99694"/>
+                </a:solidFill>
+                <a:latin typeface="Lucida Console"/>
+                <a:cs typeface="Lucida Console"/>
+              </a:rPr>
+              <a:t>e</a:t>
+            </a:r>
+            <a:r>
+              <a:rPr lang="en-GB" dirty="0">
+                <a:latin typeface="Lucida Console"/>
+                <a:cs typeface="Lucida Console"/>
+              </a:rPr>
+              <a:t> -&gt; </a:t>
             </a:r>
             <a:r>
               <a:rPr lang="en-GB" dirty="0">
@@ -3222,7 +3442,7 @@
                 <a:latin typeface="Lucida Console"/>
                 <a:cs typeface="Lucida Console"/>
               </a:rPr>
-              <a:t>Type</a:t>
+              <a:t>Tag</a:t>
             </a:r>
             <a:r>
               <a:rPr lang="en-GB" dirty="0">
@@ -3232,254 +3452,48 @@
               <a:t> </a:t>
             </a:r>
             <a:r>
-              <a:rPr lang="en-GB" b="1" dirty="0" smtClean="0">
-                <a:latin typeface="Lucida Console"/>
-                <a:cs typeface="Lucida Console"/>
-              </a:rPr>
-              <a:t>where</a:t>
-            </a:r>
-            <a:r>
-              <a:rPr lang="en-GB" dirty="0" smtClean="0">
-                <a:latin typeface="Lucida Console"/>
-                <a:cs typeface="Lucida Console"/>
-              </a:rPr>
-              <a:t>  	</a:t>
-            </a:r>
-            <a:r>
-              <a:rPr lang="en-GB" dirty="0" smtClean="0">
-                <a:solidFill>
-                  <a:schemeClr val="accent3"/>
-                </a:solidFill>
-                <a:latin typeface="Lucida Console"/>
-                <a:cs typeface="Lucida Console"/>
-              </a:rPr>
-              <a:t>TZ</a:t>
-            </a:r>
-            <a:r>
-              <a:rPr lang="en-GB" dirty="0" smtClean="0">
+              <a:rPr lang="en-GB" dirty="0">
+                <a:solidFill>
+                  <a:srgbClr val="D99694"/>
+                </a:solidFill>
+                <a:latin typeface="Lucida Console"/>
+                <a:cs typeface="Lucida Console"/>
+              </a:rPr>
+              <a:t>l</a:t>
+            </a:r>
+            <a:r>
+              <a:rPr lang="en-GB" dirty="0">
+                <a:latin typeface="Lucida Console"/>
+                <a:cs typeface="Lucida Console"/>
+              </a:rPr>
+              <a:t> (</a:t>
+            </a:r>
+            <a:r>
+              <a:rPr lang="en-GB" dirty="0">
+                <a:solidFill>
+                  <a:srgbClr val="D99694"/>
+                </a:solidFill>
+                <a:latin typeface="Lucida Console"/>
+                <a:cs typeface="Lucida Console"/>
+              </a:rPr>
+              <a:t>l' </a:t>
+            </a:r>
+            <a:r>
+              <a:rPr lang="en-GB" dirty="0">
+                <a:solidFill>
+                  <a:srgbClr val="9BBB59"/>
+                </a:solidFill>
+                <a:latin typeface="Lucida Console"/>
+                <a:cs typeface="Lucida Console"/>
+              </a:rPr>
+              <a:t>::</a:t>
+            </a:r>
+            <a:r>
+              <a:rPr lang="en-GB" dirty="0">
                 <a:latin typeface="Lucida Console"/>
                 <a:cs typeface="Lucida Console"/>
               </a:rPr>
               <a:t> </a:t>
-            </a:r>
-            <a:r>
-              <a:rPr lang="en-GB" dirty="0">
-                <a:latin typeface="Lucida Console"/>
-                <a:cs typeface="Lucida Console"/>
-              </a:rPr>
-              <a:t>: </a:t>
-            </a:r>
-            <a:r>
-              <a:rPr lang="en-GB" dirty="0">
-                <a:solidFill>
-                  <a:schemeClr val="tx2">
-                    <a:lumMod val="60000"/>
-                    <a:lumOff val="40000"/>
-                  </a:schemeClr>
-                </a:solidFill>
-                <a:latin typeface="Lucida Console"/>
-                <a:cs typeface="Lucida Console"/>
-              </a:rPr>
-              <a:t>Tag</a:t>
-            </a:r>
-            <a:r>
-              <a:rPr lang="en-GB" dirty="0">
-                <a:latin typeface="Lucida Console"/>
-                <a:cs typeface="Lucida Console"/>
-              </a:rPr>
-              <a:t> </a:t>
-            </a:r>
-            <a:r>
-              <a:rPr lang="en-GB" dirty="0">
-                <a:solidFill>
-                  <a:srgbClr val="D99694"/>
-                </a:solidFill>
-                <a:latin typeface="Lucida Console"/>
-                <a:cs typeface="Lucida Console"/>
-              </a:rPr>
-              <a:t>l</a:t>
-            </a:r>
-            <a:r>
-              <a:rPr lang="en-GB" dirty="0">
-                <a:latin typeface="Lucida Console"/>
-                <a:cs typeface="Lucida Console"/>
-              </a:rPr>
-              <a:t> (</a:t>
-            </a:r>
-            <a:r>
-              <a:rPr lang="en-GB" dirty="0">
-                <a:solidFill>
-                  <a:schemeClr val="accent2">
-                    <a:lumMod val="60000"/>
-                    <a:lumOff val="40000"/>
-                  </a:schemeClr>
-                </a:solidFill>
-                <a:latin typeface="Lucida Console"/>
-                <a:cs typeface="Lucida Console"/>
-              </a:rPr>
-              <a:t>l</a:t>
-            </a:r>
-            <a:r>
-              <a:rPr lang="en-GB" dirty="0">
-                <a:latin typeface="Lucida Console"/>
-                <a:cs typeface="Lucida Console"/>
-              </a:rPr>
-              <a:t> :: </a:t>
-            </a:r>
-            <a:r>
-              <a:rPr lang="en-GB" dirty="0">
-                <a:solidFill>
-                  <a:srgbClr val="D99694"/>
-                </a:solidFill>
-                <a:latin typeface="Lucida Console"/>
-                <a:cs typeface="Lucida Console"/>
-              </a:rPr>
-              <a:t>e</a:t>
-            </a:r>
-            <a:r>
-              <a:rPr lang="en-GB" dirty="0">
-                <a:latin typeface="Lucida Console"/>
-                <a:cs typeface="Lucida Console"/>
-              </a:rPr>
-              <a:t>)</a:t>
-            </a:r>
-          </a:p>
-          <a:p>
-            <a:r>
-              <a:rPr lang="en-GB" dirty="0" smtClean="0">
-                <a:latin typeface="Lucida Console"/>
-                <a:cs typeface="Lucida Console"/>
-              </a:rPr>
-              <a:t>	</a:t>
-            </a:r>
-            <a:r>
-              <a:rPr lang="en-GB" dirty="0" smtClean="0">
-                <a:solidFill>
-                  <a:srgbClr val="9BBB59"/>
-                </a:solidFill>
-                <a:latin typeface="Lucida Console"/>
-                <a:cs typeface="Lucida Console"/>
-              </a:rPr>
-              <a:t>TS</a:t>
-            </a:r>
-            <a:r>
-              <a:rPr lang="en-GB" dirty="0" smtClean="0">
-                <a:latin typeface="Lucida Console"/>
-                <a:cs typeface="Lucida Console"/>
-              </a:rPr>
-              <a:t> </a:t>
-            </a:r>
-            <a:r>
-              <a:rPr lang="en-GB" dirty="0">
-                <a:latin typeface="Lucida Console"/>
-                <a:cs typeface="Lucida Console"/>
-              </a:rPr>
-              <a:t>: </a:t>
-            </a:r>
-            <a:r>
-              <a:rPr lang="en-GB" dirty="0">
-                <a:solidFill>
-                  <a:srgbClr val="558ED5"/>
-                </a:solidFill>
-                <a:latin typeface="Lucida Console"/>
-                <a:cs typeface="Lucida Console"/>
-              </a:rPr>
-              <a:t>Tag</a:t>
-            </a:r>
-            <a:r>
-              <a:rPr lang="en-GB" dirty="0">
-                <a:latin typeface="Lucida Console"/>
-                <a:cs typeface="Lucida Console"/>
-              </a:rPr>
-              <a:t> </a:t>
-            </a:r>
-            <a:r>
-              <a:rPr lang="en-GB" dirty="0">
-                <a:solidFill>
-                  <a:srgbClr val="D99694"/>
-                </a:solidFill>
-                <a:latin typeface="Lucida Console"/>
-                <a:cs typeface="Lucida Console"/>
-              </a:rPr>
-              <a:t>l</a:t>
-            </a:r>
-            <a:r>
-              <a:rPr lang="en-GB" dirty="0">
-                <a:latin typeface="Lucida Console"/>
-                <a:cs typeface="Lucida Console"/>
-              </a:rPr>
-              <a:t> </a:t>
-            </a:r>
-            <a:r>
-              <a:rPr lang="en-GB" dirty="0">
-                <a:solidFill>
-                  <a:srgbClr val="D99694"/>
-                </a:solidFill>
-                <a:latin typeface="Lucida Console"/>
-                <a:cs typeface="Lucida Console"/>
-              </a:rPr>
-              <a:t>e</a:t>
-            </a:r>
-            <a:r>
-              <a:rPr lang="en-GB" dirty="0">
-                <a:latin typeface="Lucida Console"/>
-                <a:cs typeface="Lucida Console"/>
-              </a:rPr>
-              <a:t> -&gt; </a:t>
-            </a:r>
-            <a:r>
-              <a:rPr lang="en-GB" dirty="0">
-                <a:solidFill>
-                  <a:schemeClr val="tx2">
-                    <a:lumMod val="60000"/>
-                    <a:lumOff val="40000"/>
-                  </a:schemeClr>
-                </a:solidFill>
-                <a:latin typeface="Lucida Console"/>
-                <a:cs typeface="Lucida Console"/>
-              </a:rPr>
-              <a:t>Tag</a:t>
-            </a:r>
-            <a:r>
-              <a:rPr lang="en-GB" dirty="0">
-                <a:latin typeface="Lucida Console"/>
-                <a:cs typeface="Lucida Console"/>
-              </a:rPr>
-              <a:t> </a:t>
-            </a:r>
-            <a:r>
-              <a:rPr lang="en-GB" dirty="0">
-                <a:solidFill>
-                  <a:srgbClr val="D99694"/>
-                </a:solidFill>
-                <a:latin typeface="Lucida Console"/>
-                <a:cs typeface="Lucida Console"/>
-              </a:rPr>
-              <a:t>l</a:t>
-            </a:r>
-            <a:r>
-              <a:rPr lang="en-GB" dirty="0">
-                <a:latin typeface="Lucida Console"/>
-                <a:cs typeface="Lucida Console"/>
-              </a:rPr>
-              <a:t> (</a:t>
-            </a:r>
-            <a:r>
-              <a:rPr lang="en-GB" dirty="0">
-                <a:solidFill>
-                  <a:srgbClr val="D99694"/>
-                </a:solidFill>
-                <a:latin typeface="Lucida Console"/>
-                <a:cs typeface="Lucida Console"/>
-              </a:rPr>
-              <a:t>l' </a:t>
-            </a:r>
-            <a:r>
-              <a:rPr lang="en-GB" dirty="0">
-                <a:latin typeface="Lucida Console"/>
-                <a:cs typeface="Lucida Console"/>
-              </a:rPr>
-              <a:t>:: </a:t>
             </a:r>
             <a:r>
               <a:rPr lang="en-GB" dirty="0">

</xml_diff>